<commit_message>
Add test evidence for backend and frontend and ui code changes
</commit_message>
<xml_diff>
--- a/documentation/Yumekaoku-online-rental-house-bscamp-final-project.pptx
+++ b/documentation/Yumekaoku-online-rental-house-bscamp-final-project.pptx
@@ -205,7 +205,7 @@
           <a:p>
             <a:fld id="{E36A0313-F537-4ED0-973B-4729E10A826A}" type="datetimeFigureOut">
               <a:rPr lang="en-US" smtClean="0"/>
-              <a:t>1/16/2023</a:t>
+              <a:t>1/17/2023</a:t>
             </a:fld>
             <a:endParaRPr lang="en-US" dirty="0"/>
           </a:p>
@@ -10780,7 +10780,7 @@
                   <a:schemeClr val="tx1"/>
                 </a:solidFill>
               </a:rPr>
-              <a:t> – Online Rental House Service</a:t>
+              <a:t> – Online Rental House System</a:t>
             </a:r>
           </a:p>
           <a:p>
@@ -10892,6 +10892,20 @@
               </a:rPr>
               <a:t> Aung</a:t>
             </a:r>
+          </a:p>
+          <a:p>
+            <a:pPr marL="285750" indent="-285750">
+              <a:lnSpc>
+                <a:spcPct val="100000"/>
+              </a:lnSpc>
+              <a:buFont typeface="Arial" panose="020B0604020202020204" pitchFamily="34" charset="0"/>
+              <a:buChar char="•"/>
+            </a:pPr>
+            <a:endParaRPr lang="en-US" sz="1800" dirty="0">
+              <a:solidFill>
+                <a:schemeClr val="tx1"/>
+              </a:solidFill>
+            </a:endParaRPr>
           </a:p>
           <a:p>
             <a:endParaRPr lang="en-US" dirty="0"/>
@@ -11130,7 +11144,7 @@
         </p:blipFill>
         <p:spPr>
           <a:xfrm>
-            <a:off x="6483096" y="0"/>
+            <a:off x="6607383" y="186431"/>
             <a:ext cx="5020056" cy="6848856"/>
           </a:xfrm>
         </p:spPr>

</xml_diff>